<commit_message>
Project work 3 submission
</commit_message>
<xml_diff>
--- a/presentation/Part2_group.pptx
+++ b/presentation/Part2_group.pptx
@@ -202,7 +202,7 @@
           <a:p>
             <a:fld id="{5FAA1530-BBF0-F94D-A458-1B9B062BF84B}" type="datetimeFigureOut">
               <a:rPr lang="en-FI" smtClean="0"/>
-              <a:t>11.11.2025</a:t>
+              <a:t>13.11.2025</a:t>
             </a:fld>
             <a:endParaRPr lang="en-FI"/>
           </a:p>
@@ -703,7 +703,7 @@
           <a:p>
             <a:fld id="{05A18288-B85B-2D44-B86D-F3A0FAFA3DFF}" type="datetimeFigureOut">
               <a:rPr lang="en-FI" smtClean="0"/>
-              <a:t>11.11.2025</a:t>
+              <a:t>13.11.2025</a:t>
             </a:fld>
             <a:endParaRPr lang="en-FI"/>
           </a:p>
@@ -903,7 +903,7 @@
           <a:p>
             <a:fld id="{05A18288-B85B-2D44-B86D-F3A0FAFA3DFF}" type="datetimeFigureOut">
               <a:rPr lang="en-FI" smtClean="0"/>
-              <a:t>11.11.2025</a:t>
+              <a:t>13.11.2025</a:t>
             </a:fld>
             <a:endParaRPr lang="en-FI"/>
           </a:p>
@@ -1113,7 +1113,7 @@
           <a:p>
             <a:fld id="{05A18288-B85B-2D44-B86D-F3A0FAFA3DFF}" type="datetimeFigureOut">
               <a:rPr lang="en-FI" smtClean="0"/>
-              <a:t>11.11.2025</a:t>
+              <a:t>13.11.2025</a:t>
             </a:fld>
             <a:endParaRPr lang="en-FI"/>
           </a:p>
@@ -1313,7 +1313,7 @@
           <a:p>
             <a:fld id="{05A18288-B85B-2D44-B86D-F3A0FAFA3DFF}" type="datetimeFigureOut">
               <a:rPr lang="en-FI" smtClean="0"/>
-              <a:t>11.11.2025</a:t>
+              <a:t>13.11.2025</a:t>
             </a:fld>
             <a:endParaRPr lang="en-FI"/>
           </a:p>
@@ -1589,7 +1589,7 @@
           <a:p>
             <a:fld id="{05A18288-B85B-2D44-B86D-F3A0FAFA3DFF}" type="datetimeFigureOut">
               <a:rPr lang="en-FI" smtClean="0"/>
-              <a:t>11.11.2025</a:t>
+              <a:t>13.11.2025</a:t>
             </a:fld>
             <a:endParaRPr lang="en-FI"/>
           </a:p>
@@ -1857,7 +1857,7 @@
           <a:p>
             <a:fld id="{05A18288-B85B-2D44-B86D-F3A0FAFA3DFF}" type="datetimeFigureOut">
               <a:rPr lang="en-FI" smtClean="0"/>
-              <a:t>11.11.2025</a:t>
+              <a:t>13.11.2025</a:t>
             </a:fld>
             <a:endParaRPr lang="en-FI"/>
           </a:p>
@@ -2272,7 +2272,7 @@
           <a:p>
             <a:fld id="{05A18288-B85B-2D44-B86D-F3A0FAFA3DFF}" type="datetimeFigureOut">
               <a:rPr lang="en-FI" smtClean="0"/>
-              <a:t>11.11.2025</a:t>
+              <a:t>13.11.2025</a:t>
             </a:fld>
             <a:endParaRPr lang="en-FI"/>
           </a:p>
@@ -2414,7 +2414,7 @@
           <a:p>
             <a:fld id="{05A18288-B85B-2D44-B86D-F3A0FAFA3DFF}" type="datetimeFigureOut">
               <a:rPr lang="en-FI" smtClean="0"/>
-              <a:t>11.11.2025</a:t>
+              <a:t>13.11.2025</a:t>
             </a:fld>
             <a:endParaRPr lang="en-FI"/>
           </a:p>
@@ -2527,7 +2527,7 @@
           <a:p>
             <a:fld id="{05A18288-B85B-2D44-B86D-F3A0FAFA3DFF}" type="datetimeFigureOut">
               <a:rPr lang="en-FI" smtClean="0"/>
-              <a:t>11.11.2025</a:t>
+              <a:t>13.11.2025</a:t>
             </a:fld>
             <a:endParaRPr lang="en-FI"/>
           </a:p>
@@ -2840,7 +2840,7 @@
           <a:p>
             <a:fld id="{05A18288-B85B-2D44-B86D-F3A0FAFA3DFF}" type="datetimeFigureOut">
               <a:rPr lang="en-FI" smtClean="0"/>
-              <a:t>11.11.2025</a:t>
+              <a:t>13.11.2025</a:t>
             </a:fld>
             <a:endParaRPr lang="en-FI"/>
           </a:p>
@@ -3129,7 +3129,7 @@
           <a:p>
             <a:fld id="{05A18288-B85B-2D44-B86D-F3A0FAFA3DFF}" type="datetimeFigureOut">
               <a:rPr lang="en-FI" smtClean="0"/>
-              <a:t>11.11.2025</a:t>
+              <a:t>13.11.2025</a:t>
             </a:fld>
             <a:endParaRPr lang="en-FI"/>
           </a:p>
@@ -3372,7 +3372,7 @@
           <a:p>
             <a:fld id="{05A18288-B85B-2D44-B86D-F3A0FAFA3DFF}" type="datetimeFigureOut">
               <a:rPr lang="en-FI" smtClean="0"/>
-              <a:t>11.11.2025</a:t>
+              <a:t>13.11.2025</a:t>
             </a:fld>
             <a:endParaRPr lang="en-FI"/>
           </a:p>
@@ -5196,10 +5196,10 @@
       </p:pic>
       <p:pic>
         <p:nvPicPr>
-          <p:cNvPr id="6" name="Content Placeholder 3">
-            <a:extLst>
-              <a:ext uri="{FF2B5EF4-FFF2-40B4-BE49-F238E27FC236}">
-                <a16:creationId xmlns:a16="http://schemas.microsoft.com/office/drawing/2014/main" id="{722027F2-0C8C-44F3-8424-E862E61E4C0D}"/>
+          <p:cNvPr id="8" name="Content Placeholder 7">
+            <a:extLst>
+              <a:ext uri="{FF2B5EF4-FFF2-40B4-BE49-F238E27FC236}">
+                <a16:creationId xmlns:a16="http://schemas.microsoft.com/office/drawing/2014/main" id="{24836CDB-98B9-D2AB-180B-EFC1FF2A0B7F}"/>
               </a:ext>
             </a:extLst>
           </p:cNvPr>
@@ -5218,8 +5218,8 @@
         </p:blipFill>
         <p:spPr>
           <a:xfrm>
-            <a:off x="585698" y="2574787"/>
-            <a:ext cx="10701168" cy="3825854"/>
+            <a:off x="386090" y="2333115"/>
+            <a:ext cx="11419820" cy="3900273"/>
           </a:xfrm>
           <a:prstGeom prst="rect">
             <a:avLst/>

</xml_diff>